<commit_message>
Update Challange 1 and added Proctor Guide
</commit_message>
<xml_diff>
--- a/Student/Guides/Azure Monitoring Hackathon.pptx
+++ b/Student/Guides/Azure Monitoring Hackathon.pptx
@@ -603,7 +603,7 @@
           <a:p>
             <a:fld id="{53D76E38-EB4B-425D-87E0-B33791D2CD91}" type="datetimeFigureOut">
               <a:rPr lang="en-US" smtClean="0"/>
-              <a:t>10/18/2018</a:t>
+              <a:t>11/28/2018</a:t>
             </a:fld>
             <a:endParaRPr lang="en-US"/>
           </a:p>
@@ -1661,7 +1661,7 @@
           <a:p>
             <a:fld id="{3E3C2F32-47E1-4D90-8C64-89D7BCB0B356}" type="datetimeFigureOut">
               <a:rPr lang="en-US" smtClean="0"/>
-              <a:t>10/18/2018</a:t>
+              <a:t>11/28/2018</a:t>
             </a:fld>
             <a:endParaRPr lang="en-US"/>
           </a:p>
@@ -1859,7 +1859,7 @@
           <a:p>
             <a:fld id="{3E3C2F32-47E1-4D90-8C64-89D7BCB0B356}" type="datetimeFigureOut">
               <a:rPr lang="en-US" smtClean="0"/>
-              <a:t>10/18/2018</a:t>
+              <a:t>11/28/2018</a:t>
             </a:fld>
             <a:endParaRPr lang="en-US"/>
           </a:p>
@@ -2067,7 +2067,7 @@
           <a:p>
             <a:fld id="{3E3C2F32-47E1-4D90-8C64-89D7BCB0B356}" type="datetimeFigureOut">
               <a:rPr lang="en-US" smtClean="0"/>
-              <a:t>10/18/2018</a:t>
+              <a:t>11/28/2018</a:t>
             </a:fld>
             <a:endParaRPr lang="en-US"/>
           </a:p>
@@ -2265,7 +2265,7 @@
           <a:p>
             <a:fld id="{3E3C2F32-47E1-4D90-8C64-89D7BCB0B356}" type="datetimeFigureOut">
               <a:rPr lang="en-US" smtClean="0"/>
-              <a:t>10/18/2018</a:t>
+              <a:t>11/28/2018</a:t>
             </a:fld>
             <a:endParaRPr lang="en-US"/>
           </a:p>
@@ -2540,7 +2540,7 @@
           <a:p>
             <a:fld id="{3E3C2F32-47E1-4D90-8C64-89D7BCB0B356}" type="datetimeFigureOut">
               <a:rPr lang="en-US" smtClean="0"/>
-              <a:t>10/18/2018</a:t>
+              <a:t>11/28/2018</a:t>
             </a:fld>
             <a:endParaRPr lang="en-US"/>
           </a:p>
@@ -2805,7 +2805,7 @@
           <a:p>
             <a:fld id="{3E3C2F32-47E1-4D90-8C64-89D7BCB0B356}" type="datetimeFigureOut">
               <a:rPr lang="en-US" smtClean="0"/>
-              <a:t>10/18/2018</a:t>
+              <a:t>11/28/2018</a:t>
             </a:fld>
             <a:endParaRPr lang="en-US"/>
           </a:p>
@@ -3217,7 +3217,7 @@
           <a:p>
             <a:fld id="{3E3C2F32-47E1-4D90-8C64-89D7BCB0B356}" type="datetimeFigureOut">
               <a:rPr lang="en-US" smtClean="0"/>
-              <a:t>10/18/2018</a:t>
+              <a:t>11/28/2018</a:t>
             </a:fld>
             <a:endParaRPr lang="en-US"/>
           </a:p>
@@ -3358,7 +3358,7 @@
           <a:p>
             <a:fld id="{3E3C2F32-47E1-4D90-8C64-89D7BCB0B356}" type="datetimeFigureOut">
               <a:rPr lang="en-US" smtClean="0"/>
-              <a:t>10/18/2018</a:t>
+              <a:t>11/28/2018</a:t>
             </a:fld>
             <a:endParaRPr lang="en-US"/>
           </a:p>
@@ -3471,7 +3471,7 @@
           <a:p>
             <a:fld id="{3E3C2F32-47E1-4D90-8C64-89D7BCB0B356}" type="datetimeFigureOut">
               <a:rPr lang="en-US" smtClean="0"/>
-              <a:t>10/18/2018</a:t>
+              <a:t>11/28/2018</a:t>
             </a:fld>
             <a:endParaRPr lang="en-US"/>
           </a:p>
@@ -3782,7 +3782,7 @@
           <a:p>
             <a:fld id="{3E3C2F32-47E1-4D90-8C64-89D7BCB0B356}" type="datetimeFigureOut">
               <a:rPr lang="en-US" smtClean="0"/>
-              <a:t>10/18/2018</a:t>
+              <a:t>11/28/2018</a:t>
             </a:fld>
             <a:endParaRPr lang="en-US"/>
           </a:p>
@@ -4070,7 +4070,7 @@
           <a:p>
             <a:fld id="{3E3C2F32-47E1-4D90-8C64-89D7BCB0B356}" type="datetimeFigureOut">
               <a:rPr lang="en-US" smtClean="0"/>
-              <a:t>10/18/2018</a:t>
+              <a:t>11/28/2018</a:t>
             </a:fld>
             <a:endParaRPr lang="en-US"/>
           </a:p>
@@ -4311,7 +4311,7 @@
           <a:p>
             <a:fld id="{3E3C2F32-47E1-4D90-8C64-89D7BCB0B356}" type="datetimeFigureOut">
               <a:rPr lang="en-US" smtClean="0"/>
-              <a:t>10/18/2018</a:t>
+              <a:t>11/28/2018</a:t>
             </a:fld>
             <a:endParaRPr lang="en-US"/>
           </a:p>
@@ -6428,7 +6428,7 @@
         <p:spPr>
           <a:xfrm>
             <a:off x="838200" y="1492624"/>
-            <a:ext cx="10515600" cy="4684339"/>
+            <a:ext cx="9978851" cy="5000251"/>
           </a:xfrm>
         </p:spPr>
         <p:txBody>
@@ -6546,49 +6546,18 @@
             <a:pPr lvl="1"/>
             <a:r>
               <a:rPr lang="en-US" dirty="0"/>
-              <a:t>Download Azure Monitoring Hackathon as a zip file and extract it to a folder - </a:t>
-            </a:r>
+              <a:t>Download Azure Monitoring Hackathon Setup Guide and follow the instructions</a:t>
+            </a:r>
+            <a:br>
+              <a:rPr lang="en-US" dirty="0"/>
+            </a:br>
             <a:r>
               <a:rPr lang="en-US" dirty="0">
                 <a:hlinkClick r:id="rId9"/>
               </a:rPr>
-              <a:t>https://github.com/rkuehfus/AzureMonitoringHackathon</a:t>
-            </a:r>
-            <a:r>
-              <a:rPr lang="en-US" dirty="0"/>
-              <a:t> </a:t>
-            </a:r>
-          </a:p>
-          <a:p>
-            <a:pPr lvl="1"/>
-            <a:r>
-              <a:rPr lang="en-US" dirty="0"/>
-              <a:t>From the Student/Resources folder, open the </a:t>
-            </a:r>
-            <a:r>
-              <a:rPr lang="en-US" dirty="0" err="1"/>
-              <a:t>DeployMonHackEnv</a:t>
-            </a:r>
-            <a:r>
-              <a:rPr lang="en-US" dirty="0"/>
-              <a:t>.(ps1 or </a:t>
-            </a:r>
-            <a:r>
-              <a:rPr lang="en-US" dirty="0" err="1"/>
-              <a:t>sh</a:t>
-            </a:r>
-            <a:r>
-              <a:rPr lang="en-US" dirty="0"/>
-              <a:t>) and </a:t>
-            </a:r>
-            <a:r>
-              <a:rPr lang="en-US" dirty="0" err="1"/>
-              <a:t>azuredeploy.parameters.json</a:t>
-            </a:r>
-            <a:r>
-              <a:rPr lang="en-US" dirty="0"/>
-              <a:t> files and follow the instructions.</a:t>
-            </a:r>
+              <a:t>https://github.com/rkuehfus/AzureMonitoringHackathon/raw/master/Student/Guides/Azure%20Monitoring%20Hackathon%20Deployment%20Guide.docx</a:t>
+            </a:r>
+            <a:endParaRPr lang="en-US" dirty="0"/>
           </a:p>
         </p:txBody>
       </p:sp>
@@ -6926,96 +6895,118 @@
         </p:spPr>
         <p:txBody>
           <a:bodyPr>
-            <a:normAutofit fontScale="92500" lnSpcReduction="20000"/>
+            <a:normAutofit fontScale="85000" lnSpcReduction="10000"/>
           </a:bodyPr>
           <a:lstStyle/>
           <a:p>
             <a:r>
               <a:rPr lang="en-US" sz="2000" dirty="0"/>
-              <a:t>Download and Install </a:t>
+              <a:t>Create an empty database called “</a:t>
             </a:r>
             <a:r>
               <a:rPr lang="en-US" sz="2000" dirty="0" err="1"/>
-              <a:t>HammerDB</a:t>
+              <a:t>tpcc</a:t>
             </a:r>
             <a:r>
               <a:rPr lang="en-US" sz="2000" dirty="0"/>
-              <a:t> tool on the Visual Studio VM</a:t>
+              <a:t>” on the SQL Server</a:t>
+            </a:r>
+            <a:br>
+              <a:rPr lang="en-US" sz="2000" dirty="0"/>
+            </a:br>
+            <a:r>
+              <a:rPr lang="en-US" sz="2000" dirty="0"/>
+              <a:t>Note: Use SQL Auth with the username being </a:t>
+            </a:r>
+            <a:r>
+              <a:rPr lang="en-US" sz="2000" dirty="0" err="1"/>
+              <a:t>sqladmin</a:t>
+            </a:r>
+            <a:r>
+              <a:rPr lang="en-US" sz="2000" dirty="0"/>
+              <a:t> and password being whatever you used during deployment</a:t>
+            </a:r>
+          </a:p>
+          <a:p>
+            <a:r>
+              <a:rPr lang="en-US" sz="2000" dirty="0"/>
+              <a:t>From the ARM template, send the below guest OS metric to Azure Monitor for the SQL Server</a:t>
             </a:r>
           </a:p>
           <a:p>
             <a:pPr lvl="1"/>
+            <a:r>
+              <a:rPr lang="en-US" sz="1600" dirty="0"/>
+              <a:t>Add a Performance Counter Metric for </a:t>
+            </a:r>
+          </a:p>
+          <a:p>
+            <a:pPr lvl="2"/>
+            <a:r>
+              <a:rPr lang="en-US" sz="1400" dirty="0"/>
+              <a:t>Object: </a:t>
+            </a:r>
+            <a:r>
+              <a:rPr lang="en-US" sz="1400" dirty="0" err="1"/>
+              <a:t>SQLServer:Databases</a:t>
+            </a:r>
+            <a:r>
+              <a:rPr lang="en-US" sz="1400" dirty="0"/>
+              <a:t> </a:t>
+            </a:r>
+          </a:p>
+          <a:p>
+            <a:pPr lvl="2"/>
+            <a:r>
+              <a:rPr lang="en-US" sz="1400" dirty="0"/>
+              <a:t>Counter: Active Transactions</a:t>
+            </a:r>
+          </a:p>
+          <a:p>
+            <a:pPr lvl="2"/>
+            <a:r>
+              <a:rPr lang="en-US" sz="1400" dirty="0" err="1"/>
+              <a:t>Instance:tpcc</a:t>
+            </a:r>
+            <a:endParaRPr lang="en-US" sz="1400" dirty="0"/>
+          </a:p>
+          <a:p>
+            <a:pPr lvl="1"/>
+            <a:r>
+              <a:rPr lang="en-US" sz="1600" dirty="0"/>
+              <a:t>Hint: </a:t>
+            </a:r>
             <a:r>
               <a:rPr lang="en-US" sz="1600" dirty="0">
                 <a:hlinkClick r:id="rId3"/>
               </a:rPr>
+              <a:t>https://docs.microsoft.com/en-us/azure/monitoring-and-diagnostics/metrics-store-custom-guestos-resource-manager-vm</a:t>
+            </a:r>
+            <a:endParaRPr lang="en-US" sz="1600" dirty="0"/>
+          </a:p>
+          <a:p>
+            <a:r>
+              <a:rPr lang="en-US" sz="2000" dirty="0"/>
+              <a:t>Download and Install </a:t>
+            </a:r>
+            <a:r>
+              <a:rPr lang="en-US" sz="2000" dirty="0" err="1"/>
+              <a:t>HammerDB</a:t>
+            </a:r>
+            <a:r>
+              <a:rPr lang="en-US" sz="2000" dirty="0"/>
+              <a:t> tool on the Visual Studio VM</a:t>
+            </a:r>
+          </a:p>
+          <a:p>
+            <a:pPr lvl="1"/>
+            <a:r>
+              <a:rPr lang="en-US" sz="1600" dirty="0">
+                <a:hlinkClick r:id="rId4"/>
+              </a:rPr>
               <a:t>www.hammerdb.com</a:t>
             </a:r>
-            <a:endParaRPr lang="en-US" sz="1600" dirty="0"/>
-          </a:p>
-          <a:p>
-            <a:r>
-              <a:rPr lang="en-US" sz="2000" dirty="0"/>
-              <a:t>Create a database called “</a:t>
-            </a:r>
-            <a:r>
-              <a:rPr lang="en-US" sz="2000" dirty="0" err="1"/>
-              <a:t>tpcc</a:t>
-            </a:r>
-            <a:r>
-              <a:rPr lang="en-US" sz="2000" dirty="0"/>
-              <a:t>” on the SQL Server</a:t>
-            </a:r>
-          </a:p>
-          <a:p>
-            <a:r>
-              <a:rPr lang="en-US" sz="2000" dirty="0"/>
-              <a:t>From Azure Portal, Enable guest-level monitoring on SQL Server</a:t>
-            </a:r>
-          </a:p>
-          <a:p>
-            <a:pPr lvl="1"/>
-            <a:r>
-              <a:rPr lang="en-US" sz="1600" dirty="0"/>
-              <a:t>Add a Performance Counter Metric for </a:t>
-            </a:r>
-          </a:p>
-          <a:p>
-            <a:pPr lvl="2"/>
-            <a:r>
-              <a:rPr lang="en-US" sz="1400" dirty="0"/>
-              <a:t>Object: </a:t>
-            </a:r>
-            <a:r>
-              <a:rPr lang="en-US" sz="1400" dirty="0" err="1"/>
-              <a:t>SQLServer:Databases</a:t>
-            </a:r>
-            <a:r>
-              <a:rPr lang="en-US" sz="1400" dirty="0"/>
-              <a:t> </a:t>
-            </a:r>
-          </a:p>
-          <a:p>
-            <a:pPr lvl="2"/>
-            <a:r>
-              <a:rPr lang="en-US" sz="1400" dirty="0"/>
-              <a:t>Counter: Active Transactions</a:t>
-            </a:r>
-          </a:p>
-          <a:p>
-            <a:pPr lvl="2"/>
-            <a:r>
-              <a:rPr lang="en-US" sz="1400" dirty="0" err="1"/>
-              <a:t>Instance:tpcc</a:t>
-            </a:r>
-            <a:endParaRPr lang="en-US" sz="1400" dirty="0"/>
-          </a:p>
-          <a:p>
-            <a:pPr lvl="1"/>
-            <a:r>
-              <a:rPr lang="en-US" sz="1600" dirty="0"/>
-              <a:t>Extra Credit: Update your ARM Template to enable guest-level monitoring on the SQL Server and add the metric above.</a:t>
-            </a:r>
+            <a:endParaRPr lang="en-US" sz="2000" dirty="0"/>
           </a:p>
           <a:p>
             <a:r>
@@ -7028,7 +7019,7 @@
             </a:r>
             <a:r>
               <a:rPr lang="en-US" sz="2000" dirty="0"/>
-              <a:t> Build to create transaction load</a:t>
+              <a:t> to create transaction load</a:t>
             </a:r>
           </a:p>
           <a:p>
@@ -7048,7 +7039,15 @@
             <a:pPr lvl="1"/>
             <a:r>
               <a:rPr lang="en-US" sz="1600" dirty="0"/>
-              <a:t>Create an Alert if Active Transactions goes over 100 on the SQL Server </a:t>
+              <a:t>Create an Alert if Active Transactions goes </a:t>
+            </a:r>
+            <a:r>
+              <a:rPr lang="en-US" sz="1600"/>
+              <a:t>over 40 </a:t>
+            </a:r>
+            <a:r>
+              <a:rPr lang="en-US" sz="1600" dirty="0"/>
+              <a:t>on the SQL Server </a:t>
             </a:r>
             <a:r>
               <a:rPr lang="en-US" sz="1600" dirty="0" err="1"/>

</xml_diff>

<commit_message>
Updated Proctor and Setup Guide
</commit_message>
<xml_diff>
--- a/Student/Guides/Azure Monitoring Hackathon.pptx
+++ b/Student/Guides/Azure Monitoring Hackathon.pptx
@@ -603,7 +603,7 @@
           <a:p>
             <a:fld id="{53D76E38-EB4B-425D-87E0-B33791D2CD91}" type="datetimeFigureOut">
               <a:rPr lang="en-US" smtClean="0"/>
-              <a:t>12/3/2018</a:t>
+              <a:t>12/4/2018</a:t>
             </a:fld>
             <a:endParaRPr lang="en-US"/>
           </a:p>
@@ -1661,7 +1661,7 @@
           <a:p>
             <a:fld id="{3E3C2F32-47E1-4D90-8C64-89D7BCB0B356}" type="datetimeFigureOut">
               <a:rPr lang="en-US" smtClean="0"/>
-              <a:t>12/3/2018</a:t>
+              <a:t>12/4/2018</a:t>
             </a:fld>
             <a:endParaRPr lang="en-US"/>
           </a:p>
@@ -1859,7 +1859,7 @@
           <a:p>
             <a:fld id="{3E3C2F32-47E1-4D90-8C64-89D7BCB0B356}" type="datetimeFigureOut">
               <a:rPr lang="en-US" smtClean="0"/>
-              <a:t>12/3/2018</a:t>
+              <a:t>12/4/2018</a:t>
             </a:fld>
             <a:endParaRPr lang="en-US"/>
           </a:p>
@@ -2067,7 +2067,7 @@
           <a:p>
             <a:fld id="{3E3C2F32-47E1-4D90-8C64-89D7BCB0B356}" type="datetimeFigureOut">
               <a:rPr lang="en-US" smtClean="0"/>
-              <a:t>12/3/2018</a:t>
+              <a:t>12/4/2018</a:t>
             </a:fld>
             <a:endParaRPr lang="en-US"/>
           </a:p>
@@ -2265,7 +2265,7 @@
           <a:p>
             <a:fld id="{3E3C2F32-47E1-4D90-8C64-89D7BCB0B356}" type="datetimeFigureOut">
               <a:rPr lang="en-US" smtClean="0"/>
-              <a:t>12/3/2018</a:t>
+              <a:t>12/4/2018</a:t>
             </a:fld>
             <a:endParaRPr lang="en-US"/>
           </a:p>
@@ -2540,7 +2540,7 @@
           <a:p>
             <a:fld id="{3E3C2F32-47E1-4D90-8C64-89D7BCB0B356}" type="datetimeFigureOut">
               <a:rPr lang="en-US" smtClean="0"/>
-              <a:t>12/3/2018</a:t>
+              <a:t>12/4/2018</a:t>
             </a:fld>
             <a:endParaRPr lang="en-US"/>
           </a:p>
@@ -2805,7 +2805,7 @@
           <a:p>
             <a:fld id="{3E3C2F32-47E1-4D90-8C64-89D7BCB0B356}" type="datetimeFigureOut">
               <a:rPr lang="en-US" smtClean="0"/>
-              <a:t>12/3/2018</a:t>
+              <a:t>12/4/2018</a:t>
             </a:fld>
             <a:endParaRPr lang="en-US"/>
           </a:p>
@@ -3217,7 +3217,7 @@
           <a:p>
             <a:fld id="{3E3C2F32-47E1-4D90-8C64-89D7BCB0B356}" type="datetimeFigureOut">
               <a:rPr lang="en-US" smtClean="0"/>
-              <a:t>12/3/2018</a:t>
+              <a:t>12/4/2018</a:t>
             </a:fld>
             <a:endParaRPr lang="en-US"/>
           </a:p>
@@ -3358,7 +3358,7 @@
           <a:p>
             <a:fld id="{3E3C2F32-47E1-4D90-8C64-89D7BCB0B356}" type="datetimeFigureOut">
               <a:rPr lang="en-US" smtClean="0"/>
-              <a:t>12/3/2018</a:t>
+              <a:t>12/4/2018</a:t>
             </a:fld>
             <a:endParaRPr lang="en-US"/>
           </a:p>
@@ -3471,7 +3471,7 @@
           <a:p>
             <a:fld id="{3E3C2F32-47E1-4D90-8C64-89D7BCB0B356}" type="datetimeFigureOut">
               <a:rPr lang="en-US" smtClean="0"/>
-              <a:t>12/3/2018</a:t>
+              <a:t>12/4/2018</a:t>
             </a:fld>
             <a:endParaRPr lang="en-US"/>
           </a:p>
@@ -3782,7 +3782,7 @@
           <a:p>
             <a:fld id="{3E3C2F32-47E1-4D90-8C64-89D7BCB0B356}" type="datetimeFigureOut">
               <a:rPr lang="en-US" smtClean="0"/>
-              <a:t>12/3/2018</a:t>
+              <a:t>12/4/2018</a:t>
             </a:fld>
             <a:endParaRPr lang="en-US"/>
           </a:p>
@@ -4070,7 +4070,7 @@
           <a:p>
             <a:fld id="{3E3C2F32-47E1-4D90-8C64-89D7BCB0B356}" type="datetimeFigureOut">
               <a:rPr lang="en-US" smtClean="0"/>
-              <a:t>12/3/2018</a:t>
+              <a:t>12/4/2018</a:t>
             </a:fld>
             <a:endParaRPr lang="en-US"/>
           </a:p>
@@ -4311,7 +4311,7 @@
           <a:p>
             <a:fld id="{3E3C2F32-47E1-4D90-8C64-89D7BCB0B356}" type="datetimeFigureOut">
               <a:rPr lang="en-US" smtClean="0"/>
-              <a:t>12/3/2018</a:t>
+              <a:t>12/4/2018</a:t>
             </a:fld>
             <a:endParaRPr lang="en-US"/>
           </a:p>
@@ -6881,7 +6881,7 @@
         </p:spPr>
         <p:txBody>
           <a:bodyPr>
-            <a:normAutofit fontScale="85000" lnSpcReduction="10000"/>
+            <a:normAutofit fontScale="85000" lnSpcReduction="20000"/>
           </a:bodyPr>
           <a:lstStyle/>
           <a:p>
@@ -6981,7 +6981,15 @@
             </a:r>
             <a:r>
               <a:rPr lang="en-US" sz="2000" dirty="0"/>
-              <a:t> tool on the Visual Studio VM</a:t>
+              <a:t> tool on the Visual Studio VM (instructions are in your Student\Guides\Day-1 folder for setting up and using </a:t>
+            </a:r>
+            <a:r>
+              <a:rPr lang="en-US" sz="2000" dirty="0" err="1"/>
+              <a:t>Hammerdb</a:t>
+            </a:r>
+            <a:r>
+              <a:rPr lang="en-US" sz="2000" dirty="0"/>
+              <a:t>.</a:t>
             </a:r>
           </a:p>
           <a:p>
@@ -7025,15 +7033,7 @@
             <a:pPr lvl="1"/>
             <a:r>
               <a:rPr lang="en-US" sz="1600" dirty="0"/>
-              <a:t>Create an Alert if Active Transactions goes </a:t>
-            </a:r>
-            <a:r>
-              <a:rPr lang="en-US" sz="1600"/>
-              <a:t>over 40 </a:t>
-            </a:r>
-            <a:r>
-              <a:rPr lang="en-US" sz="1600" dirty="0"/>
-              <a:t>on the SQL Server </a:t>
+              <a:t>Create an Alert if Active Transactions goes over 40 on the SQL Server </a:t>
             </a:r>
             <a:r>
               <a:rPr lang="en-US" sz="1600" dirty="0" err="1"/>
@@ -7048,6 +7048,21 @@
             <a:r>
               <a:rPr lang="en-US" sz="2000" dirty="0"/>
               <a:t>Create an Alert Rule for CPU over 75% on the Virtual Scale Set that emails me when you go over the threshold.</a:t>
+            </a:r>
+            <a:br>
+              <a:rPr lang="en-US" sz="2000" dirty="0"/>
+            </a:br>
+            <a:r>
+              <a:rPr lang="en-US" sz="2000" dirty="0"/>
+              <a:t>Note: In the Student\Resources\</a:t>
+            </a:r>
+            <a:r>
+              <a:rPr lang="en-US" sz="2000" dirty="0" err="1"/>
+              <a:t>Loadscripts</a:t>
+            </a:r>
+            <a:r>
+              <a:rPr lang="en-US" sz="2000" dirty="0"/>
+              <a:t> folder you will find a CPU load script to use.</a:t>
             </a:r>
           </a:p>
           <a:p>
@@ -7301,7 +7316,7 @@
           <a:p>
             <a:r>
               <a:rPr lang="en-US" dirty="0"/>
-              <a:t>Log Analytics Challenges</a:t>
+              <a:t>Log Analytics Setup Challenge</a:t>
             </a:r>
           </a:p>
         </p:txBody>
@@ -7322,10 +7337,15 @@
             <p:ph idx="1"/>
           </p:nvPr>
         </p:nvSpPr>
-        <p:spPr/>
+        <p:spPr>
+          <a:xfrm>
+            <a:off x="838200" y="1506071"/>
+            <a:ext cx="10515600" cy="4670892"/>
+          </a:xfrm>
+        </p:spPr>
         <p:txBody>
           <a:bodyPr>
-            <a:normAutofit fontScale="85000" lnSpcReduction="20000"/>
+            <a:normAutofit fontScale="85000" lnSpcReduction="10000"/>
           </a:bodyPr>
           <a:lstStyle/>
           <a:p>
@@ -7338,7 +7358,7 @@
             <a:pPr lvl="1"/>
             <a:r>
               <a:rPr lang="en-US" dirty="0"/>
-              <a:t>From the portal connect SQL Server to your workspace. </a:t>
+              <a:t>From the portal, connect SQL Server to your workspace. </a:t>
             </a:r>
           </a:p>
           <a:p>

</xml_diff>

<commit_message>
updated text in app insights challange
</commit_message>
<xml_diff>
--- a/Student/Guides/Azure Monitoring Hackathon.pptx
+++ b/Student/Guides/Azure Monitoring Hackathon.pptx
@@ -603,7 +603,7 @@
           <a:p>
             <a:fld id="{53D76E38-EB4B-425D-87E0-B33791D2CD91}" type="datetimeFigureOut">
               <a:rPr lang="en-US" smtClean="0"/>
-              <a:t>12/4/2018</a:t>
+              <a:t>12/5/2018</a:t>
             </a:fld>
             <a:endParaRPr lang="en-US"/>
           </a:p>
@@ -1661,7 +1661,7 @@
           <a:p>
             <a:fld id="{3E3C2F32-47E1-4D90-8C64-89D7BCB0B356}" type="datetimeFigureOut">
               <a:rPr lang="en-US" smtClean="0"/>
-              <a:t>12/4/2018</a:t>
+              <a:t>12/5/2018</a:t>
             </a:fld>
             <a:endParaRPr lang="en-US"/>
           </a:p>
@@ -1859,7 +1859,7 @@
           <a:p>
             <a:fld id="{3E3C2F32-47E1-4D90-8C64-89D7BCB0B356}" type="datetimeFigureOut">
               <a:rPr lang="en-US" smtClean="0"/>
-              <a:t>12/4/2018</a:t>
+              <a:t>12/5/2018</a:t>
             </a:fld>
             <a:endParaRPr lang="en-US"/>
           </a:p>
@@ -2067,7 +2067,7 @@
           <a:p>
             <a:fld id="{3E3C2F32-47E1-4D90-8C64-89D7BCB0B356}" type="datetimeFigureOut">
               <a:rPr lang="en-US" smtClean="0"/>
-              <a:t>12/4/2018</a:t>
+              <a:t>12/5/2018</a:t>
             </a:fld>
             <a:endParaRPr lang="en-US"/>
           </a:p>
@@ -2265,7 +2265,7 @@
           <a:p>
             <a:fld id="{3E3C2F32-47E1-4D90-8C64-89D7BCB0B356}" type="datetimeFigureOut">
               <a:rPr lang="en-US" smtClean="0"/>
-              <a:t>12/4/2018</a:t>
+              <a:t>12/5/2018</a:t>
             </a:fld>
             <a:endParaRPr lang="en-US"/>
           </a:p>
@@ -2540,7 +2540,7 @@
           <a:p>
             <a:fld id="{3E3C2F32-47E1-4D90-8C64-89D7BCB0B356}" type="datetimeFigureOut">
               <a:rPr lang="en-US" smtClean="0"/>
-              <a:t>12/4/2018</a:t>
+              <a:t>12/5/2018</a:t>
             </a:fld>
             <a:endParaRPr lang="en-US"/>
           </a:p>
@@ -2805,7 +2805,7 @@
           <a:p>
             <a:fld id="{3E3C2F32-47E1-4D90-8C64-89D7BCB0B356}" type="datetimeFigureOut">
               <a:rPr lang="en-US" smtClean="0"/>
-              <a:t>12/4/2018</a:t>
+              <a:t>12/5/2018</a:t>
             </a:fld>
             <a:endParaRPr lang="en-US"/>
           </a:p>
@@ -3217,7 +3217,7 @@
           <a:p>
             <a:fld id="{3E3C2F32-47E1-4D90-8C64-89D7BCB0B356}" type="datetimeFigureOut">
               <a:rPr lang="en-US" smtClean="0"/>
-              <a:t>12/4/2018</a:t>
+              <a:t>12/5/2018</a:t>
             </a:fld>
             <a:endParaRPr lang="en-US"/>
           </a:p>
@@ -3358,7 +3358,7 @@
           <a:p>
             <a:fld id="{3E3C2F32-47E1-4D90-8C64-89D7BCB0B356}" type="datetimeFigureOut">
               <a:rPr lang="en-US" smtClean="0"/>
-              <a:t>12/4/2018</a:t>
+              <a:t>12/5/2018</a:t>
             </a:fld>
             <a:endParaRPr lang="en-US"/>
           </a:p>
@@ -3471,7 +3471,7 @@
           <a:p>
             <a:fld id="{3E3C2F32-47E1-4D90-8C64-89D7BCB0B356}" type="datetimeFigureOut">
               <a:rPr lang="en-US" smtClean="0"/>
-              <a:t>12/4/2018</a:t>
+              <a:t>12/5/2018</a:t>
             </a:fld>
             <a:endParaRPr lang="en-US"/>
           </a:p>
@@ -3782,7 +3782,7 @@
           <a:p>
             <a:fld id="{3E3C2F32-47E1-4D90-8C64-89D7BCB0B356}" type="datetimeFigureOut">
               <a:rPr lang="en-US" smtClean="0"/>
-              <a:t>12/4/2018</a:t>
+              <a:t>12/5/2018</a:t>
             </a:fld>
             <a:endParaRPr lang="en-US"/>
           </a:p>
@@ -4070,7 +4070,7 @@
           <a:p>
             <a:fld id="{3E3C2F32-47E1-4D90-8C64-89D7BCB0B356}" type="datetimeFigureOut">
               <a:rPr lang="en-US" smtClean="0"/>
-              <a:t>12/4/2018</a:t>
+              <a:t>12/5/2018</a:t>
             </a:fld>
             <a:endParaRPr lang="en-US"/>
           </a:p>
@@ -4311,7 +4311,7 @@
           <a:p>
             <a:fld id="{3E3C2F32-47E1-4D90-8C64-89D7BCB0B356}" type="datetimeFigureOut">
               <a:rPr lang="en-US" smtClean="0"/>
-              <a:t>12/4/2018</a:t>
+              <a:t>12/5/2018</a:t>
             </a:fld>
             <a:endParaRPr lang="en-US"/>
           </a:p>
@@ -5013,7 +5013,7 @@
         <p:spPr/>
         <p:txBody>
           <a:bodyPr>
-            <a:normAutofit fontScale="85000" lnSpcReduction="20000"/>
+            <a:normAutofit fontScale="77500" lnSpcReduction="20000"/>
           </a:bodyPr>
           <a:lstStyle/>
           <a:p>
@@ -5055,6 +5055,13 @@
             <a:pPr lvl="1"/>
             <a:r>
               <a:rPr lang="en-US" dirty="0"/>
+              <a:t>Add the updated Application Insights NuGet package to v2.5.1, test again</a:t>
+            </a:r>
+          </a:p>
+          <a:p>
+            <a:pPr lvl="1"/>
+            <a:r>
+              <a:rPr lang="en-US" dirty="0"/>
               <a:t>Publish </a:t>
             </a:r>
             <a:r>
@@ -5086,13 +5093,6 @@
             </a:r>
           </a:p>
           <a:p>
-            <a:pPr lvl="1"/>
-            <a:r>
-              <a:rPr lang="en-US" dirty="0"/>
-              <a:t>Generate some load and check out the results</a:t>
-            </a:r>
-          </a:p>
-          <a:p>
             <a:r>
               <a:rPr lang="en-US" dirty="0"/>
               <a:t>Create an </a:t>
@@ -5111,7 +5111,22 @@
             </a:r>
             <a:r>
               <a:rPr lang="en-US" dirty="0"/>
-              <a:t> based on the session count metric</a:t>
+              <a:t> based on the total Server requests metric</a:t>
+            </a:r>
+          </a:p>
+          <a:p>
+            <a:pPr lvl="1"/>
+            <a:r>
+              <a:rPr lang="en-US" dirty="0"/>
+              <a:t>Generate load using the URL load script in the </a:t>
+            </a:r>
+            <a:r>
+              <a:rPr lang="en-US" dirty="0" err="1"/>
+              <a:t>Loadscripts</a:t>
+            </a:r>
+            <a:r>
+              <a:rPr lang="en-US" dirty="0"/>
+              <a:t> folder</a:t>
             </a:r>
           </a:p>
           <a:p>
@@ -5124,7 +5139,7 @@
             <a:pPr lvl="1"/>
             <a:r>
               <a:rPr lang="en-US" dirty="0"/>
-              <a:t>Find the exception in App Insights</a:t>
+              <a:t>Find the exception in App Insights (Tip: try to change your password)</a:t>
             </a:r>
           </a:p>
           <a:p>
@@ -5144,19 +5159,8 @@
             </a:r>
             <a:r>
               <a:rPr lang="en-US" dirty="0"/>
-              <a:t> </a:t>
-            </a:r>
-            <a:r>
-              <a:rPr lang="en-US" dirty="0" err="1"/>
-              <a:t>scaleout</a:t>
-            </a:r>
-            <a:r>
-              <a:rPr lang="en-US" dirty="0"/>
-              <a:t> based on the App Insights metric wins the challenge.  Good luck</a:t>
-            </a:r>
-          </a:p>
-          <a:p>
-            <a:endParaRPr lang="en-US" dirty="0"/>
+              <a:t> scale out based on the App Insights metric wins the challenge.  Good luck</a:t>
+            </a:r>
           </a:p>
           <a:p>
             <a:endParaRPr lang="en-US" dirty="0"/>

</xml_diff>